<commit_message>
Remove unused title slide
</commit_message>
<xml_diff>
--- a/bdd-exercise.pptx
+++ b/bdd-exercise.pptx
@@ -5,11 +5,10 @@
     <p:sldMasterId id="2147483660" r:id="rId1"/>
   </p:sldMasterIdLst>
   <p:notesMasterIdLst>
-    <p:notesMasterId r:id="rId4"/>
+    <p:notesMasterId r:id="rId3"/>
   </p:notesMasterIdLst>
   <p:sldIdLst>
-    <p:sldId id="256" r:id="rId2"/>
-    <p:sldId id="257" r:id="rId3"/>
+    <p:sldId id="257" r:id="rId2"/>
   </p:sldIdLst>
   <p:sldSz cx="9144000" cy="6858000" type="screen4x3"/>
   <p:notesSz cx="6858000" cy="9144000"/>
@@ -532,7 +531,7 @@
           <a:p>
             <a:fld id="{A0438042-B282-8D49-AF04-639D26B35730}" type="slidenum">
               <a:rPr lang="en-US" smtClean="0"/>
-              <a:t>2</a:t>
+              <a:t>1</a:t>
             </a:fld>
             <a:endParaRPr lang="en-US"/>
           </a:p>
@@ -3966,74 +3965,6 @@
           <a:chExt cx="0" cy="0"/>
         </a:xfrm>
       </p:grpSpPr>
-      <p:sp>
-        <p:nvSpPr>
-          <p:cNvPr id="2" name="Title 1"/>
-          <p:cNvSpPr>
-            <a:spLocks noGrp="1"/>
-          </p:cNvSpPr>
-          <p:nvPr>
-            <p:ph type="ctrTitle"/>
-          </p:nvPr>
-        </p:nvSpPr>
-        <p:spPr/>
-        <p:txBody>
-          <a:bodyPr/>
-          <a:lstStyle/>
-          <a:p>
-            <a:endParaRPr lang="en-US"/>
-          </a:p>
-        </p:txBody>
-      </p:sp>
-      <p:sp>
-        <p:nvSpPr>
-          <p:cNvPr id="3" name="Subtitle 2"/>
-          <p:cNvSpPr>
-            <a:spLocks noGrp="1"/>
-          </p:cNvSpPr>
-          <p:nvPr>
-            <p:ph type="subTitle" idx="1"/>
-          </p:nvPr>
-        </p:nvSpPr>
-        <p:spPr/>
-        <p:txBody>
-          <a:bodyPr/>
-          <a:lstStyle/>
-          <a:p>
-            <a:endParaRPr lang="en-US"/>
-          </a:p>
-        </p:txBody>
-      </p:sp>
-    </p:spTree>
-    <p:extLst>
-      <p:ext uri="{BB962C8B-B14F-4D97-AF65-F5344CB8AC3E}">
-        <p14:creationId xmlns:p14="http://schemas.microsoft.com/office/powerpoint/2010/main" val="262214688"/>
-      </p:ext>
-    </p:extLst>
-  </p:cSld>
-  <p:clrMapOvr>
-    <a:masterClrMapping/>
-  </p:clrMapOvr>
-</p:sld>
-</file>
-
-<file path=ppt/slides/slide2.xml><?xml version="1.0" encoding="utf-8"?>
-<p:sld xmlns:a="http://schemas.openxmlformats.org/drawingml/2006/main" xmlns:r="http://schemas.openxmlformats.org/officeDocument/2006/relationships" xmlns:p="http://schemas.openxmlformats.org/presentationml/2006/main">
-  <p:cSld>
-    <p:spTree>
-      <p:nvGrpSpPr>
-        <p:cNvPr id="1" name=""/>
-        <p:cNvGrpSpPr/>
-        <p:nvPr/>
-      </p:nvGrpSpPr>
-      <p:grpSpPr>
-        <a:xfrm>
-          <a:off x="0" y="0"/>
-          <a:ext cx="0" cy="0"/>
-          <a:chOff x="0" y="0"/>
-          <a:chExt cx="0" cy="0"/>
-        </a:xfrm>
-      </p:grpSpPr>
       <p:grpSp>
         <p:nvGrpSpPr>
           <p:cNvPr id="15" name="Group 14"/>
@@ -4232,12 +4163,12 @@
               <a:t>Solve </a:t>
             </a:r>
             <a:r>
-              <a:rPr lang="en-US" dirty="0"/>
+              <a:rPr lang="en-US"/>
               <a:t>using </a:t>
             </a:r>
             <a:r>
-              <a:rPr lang="en-US" dirty="0" smtClean="0"/>
-              <a:t>TDD </a:t>
+              <a:rPr lang="en-US" smtClean="0"/>
+              <a:t>ATDD </a:t>
             </a:r>
             <a:r>
               <a:rPr lang="en-US" dirty="0"/>

</xml_diff>